<commit_message>
Updates to ppt and script
</commit_message>
<xml_diff>
--- a/ProjectExample/Data Science Projects.pptx
+++ b/ProjectExample/Data Science Projects.pptx
@@ -755,8 +755,8 @@
         </p:nvSpPr>
         <p:spPr>
           <a:xfrm>
-            <a:off x="381300" y="685800"/>
-            <a:ext cx="6096075" cy="3429000"/>
+            <a:off x="381000" y="685800"/>
+            <a:ext cx="6096000" cy="3429000"/>
           </a:xfrm>
           <a:custGeom>
             <a:avLst/>
@@ -1067,7 +1067,7 @@
         </p:nvSpPr>
         <p:spPr>
           <a:xfrm>
-            <a:off x="381300" y="685800"/>
+            <a:off x="381000" y="685800"/>
             <a:ext cx="6096000" cy="3429000"/>
           </a:xfrm>
           <a:custGeom>
@@ -1483,7 +1483,7 @@
         </p:nvSpPr>
         <p:spPr>
           <a:xfrm>
-            <a:off x="381300" y="685800"/>
+            <a:off x="381000" y="685800"/>
             <a:ext cx="6096000" cy="3429000"/>
           </a:xfrm>
           <a:custGeom>
@@ -1587,7 +1587,7 @@
         </p:nvSpPr>
         <p:spPr>
           <a:xfrm>
-            <a:off x="381300" y="685800"/>
+            <a:off x="381000" y="685800"/>
             <a:ext cx="6096000" cy="3429000"/>
           </a:xfrm>
           <a:custGeom>
@@ -7392,10 +7392,10 @@
               <a:buNone/>
             </a:pPr>
             <a:r>
-              <a:rPr lang="en"/>
-              <a:t>A step-by-step guide</a:t>
+              <a:rPr lang="en" dirty="0"/>
+              <a:t>A (basic) step-by-step guide</a:t>
             </a:r>
-            <a:endParaRPr/>
+            <a:endParaRPr dirty="0"/>
           </a:p>
         </p:txBody>
       </p:sp>
@@ -8078,7 +8078,23 @@
               <a:buChar char="❖"/>
             </a:pPr>
             <a:r>
-              <a:rPr lang="en" sz="2400">
+              <a:rPr lang="en" sz="2400" dirty="0">
+                <a:latin typeface="Economica"/>
+                <a:ea typeface="Economica"/>
+                <a:cs typeface="Economica"/>
+                <a:sym typeface="Economica"/>
+              </a:rPr>
+              <a:t>Look at the big picture and the challenge facing the client, and try to understand if machine learning, deep learning, or statistical analysis is necessary.</a:t>
+            </a:r>
+          </a:p>
+          <a:p>
+            <a:pPr indent="-381000">
+              <a:buSzPts val="2400"/>
+              <a:buFont typeface="Economica"/>
+              <a:buChar char="❖"/>
+            </a:pPr>
+            <a:r>
+              <a:rPr lang="en-US" sz="2400" dirty="0">
                 <a:latin typeface="Economica"/>
                 <a:ea typeface="Economica"/>
                 <a:cs typeface="Economica"/>
@@ -8086,7 +8102,7 @@
               </a:rPr>
               <a:t>What kind of model is the right solution for our data, research question, and goals?</a:t>
             </a:r>
-            <a:endParaRPr sz="2400">
+            <a:endParaRPr sz="2400" dirty="0">
               <a:latin typeface="Economica"/>
               <a:ea typeface="Economica"/>
               <a:cs typeface="Economica"/>
@@ -8106,35 +8122,7 @@
               <a:buChar char="❖"/>
             </a:pPr>
             <a:r>
-              <a:rPr lang="en" sz="2400">
-                <a:latin typeface="Economica"/>
-                <a:ea typeface="Economica"/>
-                <a:cs typeface="Economica"/>
-                <a:sym typeface="Economica"/>
-              </a:rPr>
-              <a:t>Look at the big picture and the challenge facing the client, and try to understand if machine learning, deep learning, or statistical analysis is necessary.</a:t>
-            </a:r>
-            <a:endParaRPr sz="2400">
-              <a:latin typeface="Economica"/>
-              <a:ea typeface="Economica"/>
-              <a:cs typeface="Economica"/>
-              <a:sym typeface="Economica"/>
-            </a:endParaRPr>
-          </a:p>
-          <a:p>
-            <a:pPr marL="457200" lvl="0" indent="-381000" algn="l" rtl="0">
-              <a:spcBef>
-                <a:spcPts val="0"/>
-              </a:spcBef>
-              <a:spcAft>
-                <a:spcPts val="0"/>
-              </a:spcAft>
-              <a:buSzPts val="2400"/>
-              <a:buFont typeface="Economica"/>
-              <a:buChar char="❖"/>
-            </a:pPr>
-            <a:r>
-              <a:rPr lang="en" sz="2400">
+              <a:rPr lang="en" sz="2400" dirty="0">
                 <a:latin typeface="Economica"/>
                 <a:ea typeface="Economica"/>
                 <a:cs typeface="Economica"/>
@@ -8142,7 +8130,7 @@
               </a:rPr>
               <a:t>Should we use a white-box or black-block algorithm, or some combination of both?</a:t>
             </a:r>
-            <a:endParaRPr sz="2400">
+            <a:endParaRPr sz="2400" dirty="0">
               <a:latin typeface="Economica"/>
               <a:ea typeface="Economica"/>
               <a:cs typeface="Economica"/>
@@ -8162,7 +8150,7 @@
               <a:buChar char="➢"/>
             </a:pPr>
             <a:r>
-              <a:rPr lang="en" sz="2400">
+              <a:rPr lang="en" sz="2400" dirty="0">
                 <a:latin typeface="Economica"/>
                 <a:ea typeface="Economica"/>
                 <a:cs typeface="Economica"/>
@@ -8170,7 +8158,7 @@
               </a:rPr>
               <a:t>Does the client need to be able to understand or use the algorithm, or just the results?</a:t>
             </a:r>
-            <a:endParaRPr sz="2400">
+            <a:endParaRPr sz="2400" dirty="0">
               <a:latin typeface="Economica"/>
               <a:ea typeface="Economica"/>
               <a:cs typeface="Economica"/>
@@ -8190,7 +8178,7 @@
               <a:buChar char="➢"/>
             </a:pPr>
             <a:r>
-              <a:rPr lang="en" sz="2400">
+              <a:rPr lang="en" sz="2400" dirty="0">
                 <a:latin typeface="Economica"/>
                 <a:ea typeface="Economica"/>
                 <a:cs typeface="Economica"/>
@@ -8198,7 +8186,7 @@
               </a:rPr>
               <a:t>Will this be a one-time project, or will it require continuous integration?</a:t>
             </a:r>
-            <a:endParaRPr sz="2400">
+            <a:endParaRPr sz="2400" dirty="0">
               <a:latin typeface="Economica"/>
               <a:ea typeface="Economica"/>
               <a:cs typeface="Economica"/>
@@ -8218,7 +8206,7 @@
               <a:buChar char="➢"/>
             </a:pPr>
             <a:r>
-              <a:rPr lang="en" sz="2400">
+              <a:rPr lang="en" sz="2400" dirty="0">
                 <a:latin typeface="Economica"/>
                 <a:ea typeface="Economica"/>
                 <a:cs typeface="Economica"/>
@@ -8226,7 +8214,7 @@
               </a:rPr>
               <a:t>What kind of computing power will we need? Will it be ongoing?</a:t>
             </a:r>
-            <a:endParaRPr sz="2400">
+            <a:endParaRPr sz="2400" dirty="0">
               <a:latin typeface="Economica"/>
               <a:ea typeface="Economica"/>
               <a:cs typeface="Economica"/>
@@ -8873,7 +8861,43 @@
                 <a:cs typeface="Economica"/>
                 <a:sym typeface="Economica"/>
               </a:rPr>
-              <a:t>Make sure X is a matrix and y is a vector</a:t>
+              <a:t>Make sure </a:t>
+            </a:r>
+            <a:r>
+              <a:rPr lang="en" sz="2400" i="1" dirty="0">
+                <a:latin typeface="Economica"/>
+                <a:ea typeface="Economica"/>
+                <a:cs typeface="Economica"/>
+                <a:sym typeface="Economica"/>
+              </a:rPr>
+              <a:t>x</a:t>
+            </a:r>
+            <a:r>
+              <a:rPr lang="en" sz="2400" dirty="0">
+                <a:latin typeface="Economica"/>
+                <a:ea typeface="Economica"/>
+                <a:cs typeface="Economica"/>
+                <a:sym typeface="Economica"/>
+              </a:rPr>
+              <a:t> is a matrix and </a:t>
+            </a:r>
+            <a:r>
+              <a:rPr lang="en" sz="2400" i="1" dirty="0">
+                <a:latin typeface="Economica"/>
+                <a:ea typeface="Economica"/>
+                <a:cs typeface="Economica"/>
+                <a:sym typeface="Economica"/>
+              </a:rPr>
+              <a:t>y</a:t>
+            </a:r>
+            <a:r>
+              <a:rPr lang="en" sz="2400" dirty="0">
+                <a:latin typeface="Economica"/>
+                <a:ea typeface="Economica"/>
+                <a:cs typeface="Economica"/>
+                <a:sym typeface="Economica"/>
+              </a:rPr>
+              <a:t> is a vector</a:t>
             </a:r>
             <a:endParaRPr sz="2400" dirty="0">
               <a:latin typeface="Economica"/>
@@ -9145,7 +9169,7 @@
               <a:buChar char="❖"/>
             </a:pPr>
             <a:r>
-              <a:rPr lang="en" sz="2400">
+              <a:rPr lang="en" sz="2400" dirty="0">
                 <a:latin typeface="Economica"/>
                 <a:ea typeface="Economica"/>
                 <a:cs typeface="Economica"/>
@@ -9153,7 +9177,7 @@
               </a:rPr>
               <a:t>We train a model using some data set. But we need a separate data set to test to see how the model performs. So, we use a train-test split:</a:t>
             </a:r>
-            <a:endParaRPr sz="2400">
+            <a:endParaRPr sz="2400" dirty="0">
               <a:latin typeface="Economica"/>
               <a:ea typeface="Economica"/>
               <a:cs typeface="Economica"/>
@@ -9173,7 +9197,7 @@
               <a:buChar char="➢"/>
             </a:pPr>
             <a:r>
-              <a:rPr lang="en" sz="2400">
+              <a:rPr lang="en" sz="2400" dirty="0">
                 <a:latin typeface="Economica"/>
                 <a:ea typeface="Economica"/>
                 <a:cs typeface="Economica"/>
@@ -9181,7 +9205,7 @@
               </a:rPr>
               <a:t>Training data set: The sample of data used to fit the model. The model sees and learns from this data.</a:t>
             </a:r>
-            <a:endParaRPr sz="2400">
+            <a:endParaRPr sz="2400" dirty="0">
               <a:latin typeface="Economica"/>
               <a:ea typeface="Economica"/>
               <a:cs typeface="Economica"/>
@@ -9201,7 +9225,7 @@
               <a:buChar char="➢"/>
             </a:pPr>
             <a:r>
-              <a:rPr lang="en" sz="2400">
+              <a:rPr lang="en" sz="2400" dirty="0">
                 <a:latin typeface="Economica"/>
                 <a:ea typeface="Economica"/>
                 <a:cs typeface="Economica"/>
@@ -9209,7 +9233,7 @@
               </a:rPr>
               <a:t>Test data set: The sample of data used to provide an unbiased evaluation of a final model fit on the training dataset.</a:t>
             </a:r>
-            <a:endParaRPr sz="2400">
+            <a:endParaRPr sz="2400" dirty="0">
               <a:latin typeface="Economica"/>
               <a:ea typeface="Economica"/>
               <a:cs typeface="Economica"/>
@@ -9229,7 +9253,7 @@
               <a:buChar char="❖"/>
             </a:pPr>
             <a:r>
-              <a:rPr lang="en" sz="2400">
+              <a:rPr lang="en" sz="2400" dirty="0">
                 <a:latin typeface="Economica"/>
                 <a:ea typeface="Economica"/>
                 <a:cs typeface="Economica"/>
@@ -9237,7 +9261,7 @@
               </a:rPr>
               <a:t>There are more complicated versions of this, but this is the general idea. </a:t>
             </a:r>
-            <a:endParaRPr sz="2400">
+            <a:endParaRPr sz="2400" dirty="0">
               <a:latin typeface="Economica"/>
               <a:ea typeface="Economica"/>
               <a:cs typeface="Economica"/>
@@ -9257,15 +9281,33 @@
               <a:buChar char="❖"/>
             </a:pPr>
             <a:r>
-              <a:rPr lang="en" sz="2400">
+              <a:rPr lang="en" sz="2400" dirty="0">
                 <a:latin typeface="Economica"/>
                 <a:ea typeface="Economica"/>
                 <a:cs typeface="Economica"/>
                 <a:sym typeface="Economica"/>
               </a:rPr>
-              <a:t>This can be done manually, or with packages (caTools in R, sklearn in Python, etc.)</a:t>
+              <a:t>This can be done manually, or with packages (caret in R, </a:t>
             </a:r>
-            <a:endParaRPr sz="2400">
+            <a:r>
+              <a:rPr lang="en" sz="2400" dirty="0" err="1">
+                <a:latin typeface="Economica"/>
+                <a:ea typeface="Economica"/>
+                <a:cs typeface="Economica"/>
+                <a:sym typeface="Economica"/>
+              </a:rPr>
+              <a:t>sklearn</a:t>
+            </a:r>
+            <a:r>
+              <a:rPr lang="en" sz="2400" dirty="0">
+                <a:latin typeface="Economica"/>
+                <a:ea typeface="Economica"/>
+                <a:cs typeface="Economica"/>
+                <a:sym typeface="Economica"/>
+              </a:rPr>
+              <a:t> in Python, etc.)</a:t>
+            </a:r>
+            <a:endParaRPr sz="2400" dirty="0">
               <a:latin typeface="Economica"/>
               <a:ea typeface="Economica"/>
               <a:cs typeface="Economica"/>
@@ -9282,7 +9324,7 @@
               </a:spcAft>
               <a:buNone/>
             </a:pPr>
-            <a:endParaRPr sz="2400">
+            <a:endParaRPr sz="2400" dirty="0">
               <a:latin typeface="Economica"/>
               <a:ea typeface="Economica"/>
               <a:cs typeface="Economica"/>
@@ -9351,10 +9393,10 @@
               <a:buNone/>
             </a:pPr>
             <a:r>
-              <a:rPr lang="en"/>
+              <a:rPr lang="en" dirty="0"/>
               <a:t>6. Build the model</a:t>
             </a:r>
-            <a:endParaRPr/>
+            <a:endParaRPr dirty="0"/>
           </a:p>
         </p:txBody>
       </p:sp>
@@ -9395,7 +9437,7 @@
               <a:buChar char="❖"/>
             </a:pPr>
             <a:r>
-              <a:rPr lang="en" sz="2400">
+              <a:rPr lang="en" sz="2400" dirty="0">
                 <a:latin typeface="Economica"/>
                 <a:ea typeface="Economica"/>
                 <a:cs typeface="Economica"/>
@@ -9403,7 +9445,7 @@
               </a:rPr>
               <a:t>This is often the simplest part of the process, once you’ve decided on the type of algorithm to use. </a:t>
             </a:r>
-            <a:endParaRPr sz="2400">
+            <a:endParaRPr sz="2400" dirty="0">
               <a:latin typeface="Economica"/>
               <a:ea typeface="Economica"/>
               <a:cs typeface="Economica"/>
@@ -9423,7 +9465,7 @@
               <a:buChar char="❖"/>
             </a:pPr>
             <a:r>
-              <a:rPr lang="en" sz="2400">
+              <a:rPr lang="en" sz="2400" dirty="0">
                 <a:latin typeface="Economica"/>
                 <a:ea typeface="Economica"/>
                 <a:cs typeface="Economica"/>
@@ -9431,7 +9473,7 @@
               </a:rPr>
               <a:t>Some possible methods:</a:t>
             </a:r>
-            <a:endParaRPr sz="2400">
+            <a:endParaRPr sz="2400" dirty="0">
               <a:latin typeface="Economica"/>
               <a:ea typeface="Economica"/>
               <a:cs typeface="Economica"/>
@@ -9451,15 +9493,15 @@
               <a:buChar char="➢"/>
             </a:pPr>
             <a:r>
-              <a:rPr lang="en" sz="1800">
+              <a:rPr lang="en" sz="1800" dirty="0">
                 <a:latin typeface="Economica"/>
                 <a:ea typeface="Economica"/>
                 <a:cs typeface="Economica"/>
                 <a:sym typeface="Economica"/>
               </a:rPr>
-              <a:t>All-in: put every variables in because of either prior knowledge (you know it’s important) or you have to or prepare for backward elimination</a:t>
+              <a:t>All-in: put every variables in because of either prior knowledge (you know it’s important) or to prepare for backward elimination</a:t>
             </a:r>
-            <a:endParaRPr sz="1800">
+            <a:endParaRPr sz="1800" dirty="0">
               <a:latin typeface="Economica"/>
               <a:ea typeface="Economica"/>
               <a:cs typeface="Economica"/>
@@ -9479,15 +9521,15 @@
               <a:buChar char="➢"/>
             </a:pPr>
             <a:r>
-              <a:rPr lang="en" sz="1800">
+              <a:rPr lang="en" sz="1800" dirty="0">
                 <a:latin typeface="Economica"/>
                 <a:ea typeface="Economica"/>
                 <a:cs typeface="Economica"/>
                 <a:sym typeface="Economica"/>
               </a:rPr>
-              <a:t>Backward elimination: fit and test models until the variables with the highest p-value is still smaller than your chosen significant level</a:t>
+              <a:t>Backward elimination: fit and test models until the variable with the highest p-value is still smaller than your chosen significant level</a:t>
             </a:r>
-            <a:endParaRPr sz="1800">
+            <a:endParaRPr sz="1800" dirty="0">
               <a:latin typeface="Economica"/>
               <a:ea typeface="Economica"/>
               <a:cs typeface="Economica"/>
@@ -9507,7 +9549,7 @@
               <a:buChar char="➢"/>
             </a:pPr>
             <a:r>
-              <a:rPr lang="en" sz="1800">
+              <a:rPr lang="en" sz="1800" dirty="0">
                 <a:latin typeface="Economica"/>
                 <a:ea typeface="Economica"/>
                 <a:cs typeface="Economica"/>
@@ -9515,7 +9557,7 @@
               </a:rPr>
               <a:t>Forward selection: incrementally add variables with smallest p-value, stop when p-value &gt; significant level</a:t>
             </a:r>
-            <a:endParaRPr sz="1800">
+            <a:endParaRPr sz="1800" dirty="0">
               <a:latin typeface="Economica"/>
               <a:ea typeface="Economica"/>
               <a:cs typeface="Economica"/>
@@ -9535,7 +9577,7 @@
               <a:buChar char="➢"/>
             </a:pPr>
             <a:r>
-              <a:rPr lang="en" sz="1800">
+              <a:rPr lang="en" sz="1800" dirty="0">
                 <a:latin typeface="Economica"/>
                 <a:ea typeface="Economica"/>
                 <a:cs typeface="Economica"/>
@@ -9543,7 +9585,7 @@
               </a:rPr>
               <a:t>Bidirectional selection: combination of backward elimination and forward selection</a:t>
             </a:r>
-            <a:endParaRPr sz="1800">
+            <a:endParaRPr sz="1800" dirty="0">
               <a:latin typeface="Economica"/>
               <a:ea typeface="Economica"/>
               <a:cs typeface="Economica"/>
@@ -9563,7 +9605,7 @@
               <a:buChar char="➢"/>
             </a:pPr>
             <a:r>
-              <a:rPr lang="en" sz="1800">
+              <a:rPr lang="en" sz="1800" dirty="0">
                 <a:latin typeface="Economica"/>
                 <a:ea typeface="Economica"/>
                 <a:cs typeface="Economica"/>
@@ -9571,7 +9613,7 @@
               </a:rPr>
               <a:t>etc.</a:t>
             </a:r>
-            <a:endParaRPr sz="1800">
+            <a:endParaRPr sz="1800" dirty="0">
               <a:latin typeface="Economica"/>
               <a:ea typeface="Economica"/>
               <a:cs typeface="Economica"/>
@@ -9588,7 +9630,7 @@
               </a:spcAft>
               <a:buNone/>
             </a:pPr>
-            <a:endParaRPr sz="2400">
+            <a:endParaRPr sz="2400" dirty="0">
               <a:latin typeface="Economica"/>
               <a:ea typeface="Economica"/>
               <a:cs typeface="Economica"/>

</xml_diff>